<commit_message>
tried GUI memory growth and Tensorflow batch file reading, worse time, todo - read files at once, but unpack on its own
</commit_message>
<xml_diff>
--- a/progress.pptx
+++ b/progress.pptx
@@ -1955,7 +1955,7 @@
           <a:p>
             <a:fld id="{F55DDC14-40C8-49D0-972B-D0099654A4BB}" type="datetimeFigureOut">
               <a:rPr lang="cs-CZ" smtClean="0"/>
-              <a:t>15.11.2024</a:t>
+              <a:t>18.11.2024</a:t>
             </a:fld>
             <a:endParaRPr lang="cs-CZ"/>
           </a:p>
@@ -2155,7 +2155,7 @@
           <a:p>
             <a:fld id="{F55DDC14-40C8-49D0-972B-D0099654A4BB}" type="datetimeFigureOut">
               <a:rPr lang="cs-CZ" smtClean="0"/>
-              <a:t>15.11.2024</a:t>
+              <a:t>18.11.2024</a:t>
             </a:fld>
             <a:endParaRPr lang="cs-CZ"/>
           </a:p>
@@ -2365,7 +2365,7 @@
           <a:p>
             <a:fld id="{F55DDC14-40C8-49D0-972B-D0099654A4BB}" type="datetimeFigureOut">
               <a:rPr lang="cs-CZ" smtClean="0"/>
-              <a:t>15.11.2024</a:t>
+              <a:t>18.11.2024</a:t>
             </a:fld>
             <a:endParaRPr lang="cs-CZ"/>
           </a:p>
@@ -2565,7 +2565,7 @@
           <a:p>
             <a:fld id="{F55DDC14-40C8-49D0-972B-D0099654A4BB}" type="datetimeFigureOut">
               <a:rPr lang="cs-CZ" smtClean="0"/>
-              <a:t>15.11.2024</a:t>
+              <a:t>18.11.2024</a:t>
             </a:fld>
             <a:endParaRPr lang="cs-CZ"/>
           </a:p>
@@ -2841,7 +2841,7 @@
           <a:p>
             <a:fld id="{F55DDC14-40C8-49D0-972B-D0099654A4BB}" type="datetimeFigureOut">
               <a:rPr lang="cs-CZ" smtClean="0"/>
-              <a:t>15.11.2024</a:t>
+              <a:t>18.11.2024</a:t>
             </a:fld>
             <a:endParaRPr lang="cs-CZ"/>
           </a:p>
@@ -3109,7 +3109,7 @@
           <a:p>
             <a:fld id="{F55DDC14-40C8-49D0-972B-D0099654A4BB}" type="datetimeFigureOut">
               <a:rPr lang="cs-CZ" smtClean="0"/>
-              <a:t>15.11.2024</a:t>
+              <a:t>18.11.2024</a:t>
             </a:fld>
             <a:endParaRPr lang="cs-CZ"/>
           </a:p>
@@ -3524,7 +3524,7 @@
           <a:p>
             <a:fld id="{F55DDC14-40C8-49D0-972B-D0099654A4BB}" type="datetimeFigureOut">
               <a:rPr lang="cs-CZ" smtClean="0"/>
-              <a:t>15.11.2024</a:t>
+              <a:t>18.11.2024</a:t>
             </a:fld>
             <a:endParaRPr lang="cs-CZ"/>
           </a:p>
@@ -3666,7 +3666,7 @@
           <a:p>
             <a:fld id="{F55DDC14-40C8-49D0-972B-D0099654A4BB}" type="datetimeFigureOut">
               <a:rPr lang="cs-CZ" smtClean="0"/>
-              <a:t>15.11.2024</a:t>
+              <a:t>18.11.2024</a:t>
             </a:fld>
             <a:endParaRPr lang="cs-CZ"/>
           </a:p>
@@ -3779,7 +3779,7 @@
           <a:p>
             <a:fld id="{F55DDC14-40C8-49D0-972B-D0099654A4BB}" type="datetimeFigureOut">
               <a:rPr lang="cs-CZ" smtClean="0"/>
-              <a:t>15.11.2024</a:t>
+              <a:t>18.11.2024</a:t>
             </a:fld>
             <a:endParaRPr lang="cs-CZ"/>
           </a:p>
@@ -4092,7 +4092,7 @@
           <a:p>
             <a:fld id="{F55DDC14-40C8-49D0-972B-D0099654A4BB}" type="datetimeFigureOut">
               <a:rPr lang="cs-CZ" smtClean="0"/>
-              <a:t>15.11.2024</a:t>
+              <a:t>18.11.2024</a:t>
             </a:fld>
             <a:endParaRPr lang="cs-CZ"/>
           </a:p>
@@ -4381,7 +4381,7 @@
           <a:p>
             <a:fld id="{F55DDC14-40C8-49D0-972B-D0099654A4BB}" type="datetimeFigureOut">
               <a:rPr lang="cs-CZ" smtClean="0"/>
-              <a:t>15.11.2024</a:t>
+              <a:t>18.11.2024</a:t>
             </a:fld>
             <a:endParaRPr lang="cs-CZ"/>
           </a:p>
@@ -4624,7 +4624,7 @@
           <a:p>
             <a:fld id="{F55DDC14-40C8-49D0-972B-D0099654A4BB}" type="datetimeFigureOut">
               <a:rPr lang="cs-CZ" smtClean="0"/>
-              <a:t>15.11.2024</a:t>
+              <a:t>18.11.2024</a:t>
             </a:fld>
             <a:endParaRPr lang="cs-CZ"/>
           </a:p>
@@ -9871,62 +9871,6 @@
           <a:chExt cx="0" cy="0"/>
         </a:xfrm>
       </p:grpSpPr>
-      <p:sp>
-        <p:nvSpPr>
-          <p:cNvPr id="2" name="Nadpis 1">
-            <a:extLst>
-              <a:ext uri="{FF2B5EF4-FFF2-40B4-BE49-F238E27FC236}">
-                <a16:creationId xmlns:a16="http://schemas.microsoft.com/office/drawing/2014/main" id="{0847F631-524B-ED85-B6B9-EB4B479CA2AD}"/>
-              </a:ext>
-            </a:extLst>
-          </p:cNvPr>
-          <p:cNvSpPr>
-            <a:spLocks noGrp="1"/>
-          </p:cNvSpPr>
-          <p:nvPr>
-            <p:ph type="title"/>
-          </p:nvPr>
-        </p:nvSpPr>
-        <p:spPr>
-          <a:xfrm>
-            <a:off x="226719" y="111125"/>
-            <a:ext cx="10515600" cy="1325563"/>
-          </a:xfrm>
-        </p:spPr>
-        <p:txBody>
-          <a:bodyPr>
-            <a:normAutofit/>
-          </a:bodyPr>
-          <a:lstStyle/>
-          <a:p>
-            <a:r>
-              <a:rPr lang="cs-CZ" sz="3600" dirty="0"/>
-              <a:t>Disk </a:t>
-            </a:r>
-            <a:r>
-              <a:rPr lang="cs-CZ" sz="3600" dirty="0" err="1"/>
-              <a:t>capabilities</a:t>
-            </a:r>
-            <a:r>
-              <a:rPr lang="cs-CZ" sz="3600" dirty="0"/>
-              <a:t> – 1 </a:t>
-            </a:r>
-            <a:r>
-              <a:rPr lang="cs-CZ" sz="3600" dirty="0" err="1"/>
-              <a:t>process</a:t>
-            </a:r>
-            <a:r>
-              <a:rPr lang="cs-CZ" sz="3600" dirty="0"/>
-              <a:t> VS 8 </a:t>
-            </a:r>
-            <a:r>
-              <a:rPr lang="cs-CZ" sz="3600" dirty="0" err="1"/>
-              <a:t>processes</a:t>
-            </a:r>
-            <a:endParaRPr lang="cs-CZ" dirty="0" err="1"/>
-          </a:p>
-        </p:txBody>
-      </p:sp>
       <p:pic>
         <p:nvPicPr>
           <p:cNvPr id="4" name="Obrázek 3" descr="Obsah obrázku text, snímek obrazovky, menu, Písmo&#10;&#10;Popis se vygeneroval automaticky.">
@@ -9949,8 +9893,8 @@
         </p:blipFill>
         <p:spPr>
           <a:xfrm>
-            <a:off x="6316248" y="125805"/>
-            <a:ext cx="4727509" cy="6613711"/>
+            <a:off x="6209986" y="-14294"/>
+            <a:ext cx="4912345" cy="6872294"/>
           </a:xfrm>
           <a:prstGeom prst="rect">
             <a:avLst/>
@@ -9979,14 +9923,170 @@
         </p:blipFill>
         <p:spPr>
           <a:xfrm>
-            <a:off x="638002" y="109967"/>
-            <a:ext cx="4649068" cy="6490446"/>
+            <a:off x="1069669" y="-14294"/>
+            <a:ext cx="4912345" cy="6858000"/>
           </a:xfrm>
           <a:prstGeom prst="rect">
             <a:avLst/>
           </a:prstGeom>
         </p:spPr>
       </p:pic>
+      <p:cxnSp>
+        <p:nvCxnSpPr>
+          <p:cNvPr id="6" name="Straight Connector 5">
+            <a:extLst>
+              <a:ext uri="{FF2B5EF4-FFF2-40B4-BE49-F238E27FC236}">
+                <a16:creationId xmlns:a16="http://schemas.microsoft.com/office/drawing/2014/main" id="{795E6FEB-22B1-CBDC-9133-218DA467233D}"/>
+              </a:ext>
+            </a:extLst>
+          </p:cNvPr>
+          <p:cNvCxnSpPr>
+            <a:cxnSpLocks/>
+          </p:cNvCxnSpPr>
+          <p:nvPr/>
+        </p:nvCxnSpPr>
+        <p:spPr>
+          <a:xfrm>
+            <a:off x="4636008" y="3712464"/>
+            <a:ext cx="6409944" cy="0"/>
+          </a:xfrm>
+          <a:prstGeom prst="line">
+            <a:avLst/>
+          </a:prstGeom>
+          <a:ln w="28575"/>
+        </p:spPr>
+        <p:style>
+          <a:lnRef idx="2">
+            <a:schemeClr val="accent2"/>
+          </a:lnRef>
+          <a:fillRef idx="0">
+            <a:schemeClr val="accent2"/>
+          </a:fillRef>
+          <a:effectRef idx="1">
+            <a:schemeClr val="accent2"/>
+          </a:effectRef>
+          <a:fontRef idx="minor">
+            <a:schemeClr val="tx1"/>
+          </a:fontRef>
+        </p:style>
+      </p:cxnSp>
+      <p:cxnSp>
+        <p:nvCxnSpPr>
+          <p:cNvPr id="13" name="Straight Connector 12">
+            <a:extLst>
+              <a:ext uri="{FF2B5EF4-FFF2-40B4-BE49-F238E27FC236}">
+                <a16:creationId xmlns:a16="http://schemas.microsoft.com/office/drawing/2014/main" id="{CF87E764-DDAE-9361-0E01-A1669E677462}"/>
+              </a:ext>
+            </a:extLst>
+          </p:cNvPr>
+          <p:cNvCxnSpPr>
+            <a:cxnSpLocks/>
+          </p:cNvCxnSpPr>
+          <p:nvPr/>
+        </p:nvCxnSpPr>
+        <p:spPr>
+          <a:xfrm>
+            <a:off x="4568952" y="4550664"/>
+            <a:ext cx="6409944" cy="0"/>
+          </a:xfrm>
+          <a:prstGeom prst="line">
+            <a:avLst/>
+          </a:prstGeom>
+          <a:ln w="28575"/>
+        </p:spPr>
+        <p:style>
+          <a:lnRef idx="2">
+            <a:schemeClr val="accent2"/>
+          </a:lnRef>
+          <a:fillRef idx="0">
+            <a:schemeClr val="accent2"/>
+          </a:fillRef>
+          <a:effectRef idx="1">
+            <a:schemeClr val="accent2"/>
+          </a:effectRef>
+          <a:fontRef idx="minor">
+            <a:schemeClr val="tx1"/>
+          </a:fontRef>
+        </p:style>
+      </p:cxnSp>
+      <p:cxnSp>
+        <p:nvCxnSpPr>
+          <p:cNvPr id="14" name="Straight Connector 13">
+            <a:extLst>
+              <a:ext uri="{FF2B5EF4-FFF2-40B4-BE49-F238E27FC236}">
+                <a16:creationId xmlns:a16="http://schemas.microsoft.com/office/drawing/2014/main" id="{364E83DC-C3DF-1A57-5FC5-DB95B9069EB2}"/>
+              </a:ext>
+            </a:extLst>
+          </p:cNvPr>
+          <p:cNvCxnSpPr>
+            <a:cxnSpLocks/>
+          </p:cNvCxnSpPr>
+          <p:nvPr/>
+        </p:nvCxnSpPr>
+        <p:spPr>
+          <a:xfrm>
+            <a:off x="4568952" y="5428488"/>
+            <a:ext cx="6409944" cy="0"/>
+          </a:xfrm>
+          <a:prstGeom prst="line">
+            <a:avLst/>
+          </a:prstGeom>
+          <a:ln w="28575"/>
+        </p:spPr>
+        <p:style>
+          <a:lnRef idx="2">
+            <a:schemeClr val="accent2"/>
+          </a:lnRef>
+          <a:fillRef idx="0">
+            <a:schemeClr val="accent2"/>
+          </a:fillRef>
+          <a:effectRef idx="1">
+            <a:schemeClr val="accent2"/>
+          </a:effectRef>
+          <a:fontRef idx="minor">
+            <a:schemeClr val="tx1"/>
+          </a:fontRef>
+        </p:style>
+      </p:cxnSp>
+      <p:cxnSp>
+        <p:nvCxnSpPr>
+          <p:cNvPr id="15" name="Straight Connector 14">
+            <a:extLst>
+              <a:ext uri="{FF2B5EF4-FFF2-40B4-BE49-F238E27FC236}">
+                <a16:creationId xmlns:a16="http://schemas.microsoft.com/office/drawing/2014/main" id="{5E174696-5D22-CBCB-C903-298F53403698}"/>
+              </a:ext>
+            </a:extLst>
+          </p:cNvPr>
+          <p:cNvCxnSpPr>
+            <a:cxnSpLocks/>
+          </p:cNvCxnSpPr>
+          <p:nvPr/>
+        </p:nvCxnSpPr>
+        <p:spPr>
+          <a:xfrm>
+            <a:off x="4568952" y="6288024"/>
+            <a:ext cx="6409944" cy="0"/>
+          </a:xfrm>
+          <a:prstGeom prst="line">
+            <a:avLst/>
+          </a:prstGeom>
+          <a:ln w="28575"/>
+        </p:spPr>
+        <p:style>
+          <a:lnRef idx="2">
+            <a:schemeClr val="accent2"/>
+          </a:lnRef>
+          <a:fillRef idx="0">
+            <a:schemeClr val="accent2"/>
+          </a:fillRef>
+          <a:effectRef idx="1">
+            <a:schemeClr val="accent2"/>
+          </a:effectRef>
+          <a:fontRef idx="minor">
+            <a:schemeClr val="tx1"/>
+          </a:fontRef>
+        </p:style>
+      </p:cxnSp>
     </p:spTree>
     <p:extLst>
       <p:ext uri="{BB962C8B-B14F-4D97-AF65-F5344CB8AC3E}">
@@ -10093,8 +10193,13 @@
             </a:pPr>
             <a:r>
               <a:rPr lang="en-GB" dirty="0"/>
-              <a:t>In existing Python code tried: multiprocessing, pool, multithreading, future/promise, executor, manager, manually creating, multi-terminal, GIL disabled, producer-consumer approach…</a:t>
-            </a:r>
+              <a:t>In existing Python code tried: multiprocessing, pool, multithreading, future/promise, executor, manager, manually creating, multi-terminal, GIL disabled, producer-consumer approach</a:t>
+            </a:r>
+            <a:r>
+              <a:rPr lang="en-GB"/>
+              <a:t>, tensor-flow tool, </a:t>
+            </a:r>
+            <a:endParaRPr lang="en-GB" dirty="0"/>
           </a:p>
           <a:p>
             <a:pPr marL="285750" indent="-285750">
@@ -10109,8 +10214,40 @@
               <a:buChar char="-"/>
             </a:pPr>
             <a:r>
-              <a:rPr lang="en-GB"/>
-              <a:t>Profiled with htop, iotop, task manager, mnom, cProfile =&gt; all cores are used to 100%, tasks evenly spread, no high I/O latency/idle time (?), no high disk usage latency/idle time (?)</a:t>
+              <a:rPr lang="en-GB" dirty="0"/>
+              <a:t>Profiled with </a:t>
+            </a:r>
+            <a:r>
+              <a:rPr lang="en-GB" dirty="0" err="1"/>
+              <a:t>htop</a:t>
+            </a:r>
+            <a:r>
+              <a:rPr lang="en-GB" dirty="0"/>
+              <a:t>, </a:t>
+            </a:r>
+            <a:r>
+              <a:rPr lang="en-GB" dirty="0" err="1"/>
+              <a:t>iotop</a:t>
+            </a:r>
+            <a:r>
+              <a:rPr lang="en-GB" dirty="0"/>
+              <a:t>, task manager, </a:t>
+            </a:r>
+            <a:r>
+              <a:rPr lang="en-GB" dirty="0" err="1"/>
+              <a:t>mnom</a:t>
+            </a:r>
+            <a:r>
+              <a:rPr lang="en-GB" dirty="0"/>
+              <a:t>, </a:t>
+            </a:r>
+            <a:r>
+              <a:rPr lang="en-GB" dirty="0" err="1"/>
+              <a:t>cProfile</a:t>
+            </a:r>
+            <a:r>
+              <a:rPr lang="en-GB" dirty="0"/>
+              <a:t> =&gt; all cores are used to 100%, tasks evenly spread, no high I/O latency/idle time (?), no high disk usage latency/idle time (?)</a:t>
             </a:r>
           </a:p>
           <a:p>
@@ -10126,8 +10263,24 @@
               <a:buChar char="-"/>
             </a:pPr>
             <a:r>
-              <a:rPr lang="en-GB"/>
-              <a:t>On windows PC: AMD Ryzen 5 7600X 6-Core Processor, 4.70 GHz, RAM 32,0 GB, Virtualization enbaled with 12 logical cores, SSD</a:t>
+              <a:rPr lang="en-GB" dirty="0"/>
+              <a:t>On windows PC: AMD </a:t>
+            </a:r>
+            <a:r>
+              <a:rPr lang="en-GB" dirty="0" err="1"/>
+              <a:t>Ryzen</a:t>
+            </a:r>
+            <a:r>
+              <a:rPr lang="en-GB" dirty="0"/>
+              <a:t> 5 7600X 6-Core Processor, 4.70 GHz, RAM 32,0 GB, Virtualization </a:t>
+            </a:r>
+            <a:r>
+              <a:rPr lang="en-GB" dirty="0" err="1"/>
+              <a:t>enbaled</a:t>
+            </a:r>
+            <a:r>
+              <a:rPr lang="en-GB" dirty="0"/>
+              <a:t> with 12 logical cores, SSD</a:t>
             </a:r>
           </a:p>
           <a:p>
@@ -10143,18 +10296,54 @@
               <a:buChar char="-"/>
             </a:pPr>
             <a:r>
-              <a:rPr lang="en-GB"/>
-              <a:t>On linux ubuntu 20.04 laptop: </a:t>
-            </a:r>
-            <a:r>
-              <a:rPr lang="en-GB">
+              <a:rPr lang="en-GB" dirty="0"/>
+              <a:t>On </a:t>
+            </a:r>
+            <a:r>
+              <a:rPr lang="en-GB" dirty="0" err="1"/>
+              <a:t>linux</a:t>
+            </a:r>
+            <a:r>
+              <a:rPr lang="en-GB" dirty="0"/>
+              <a:t> ubuntu 20.04 laptop: </a:t>
+            </a:r>
+            <a:r>
+              <a:rPr lang="en-GB" dirty="0">
                 <a:ea typeface="+mn-lt"/>
                 <a:cs typeface="+mn-lt"/>
               </a:rPr>
-              <a:t>AMD® Ryzen 7 4700u with radeon graphics × 8</a:t>
-            </a:r>
-            <a:r>
-              <a:rPr lang="en-GB"/>
+              <a:t>AMD® </a:t>
+            </a:r>
+            <a:r>
+              <a:rPr lang="en-GB" dirty="0" err="1">
+                <a:ea typeface="+mn-lt"/>
+                <a:cs typeface="+mn-lt"/>
+              </a:rPr>
+              <a:t>Ryzen</a:t>
+            </a:r>
+            <a:r>
+              <a:rPr lang="en-GB" dirty="0">
+                <a:ea typeface="+mn-lt"/>
+                <a:cs typeface="+mn-lt"/>
+              </a:rPr>
+              <a:t> 7 4700u with </a:t>
+            </a:r>
+            <a:r>
+              <a:rPr lang="en-GB" dirty="0" err="1">
+                <a:ea typeface="+mn-lt"/>
+                <a:cs typeface="+mn-lt"/>
+              </a:rPr>
+              <a:t>radeon</a:t>
+            </a:r>
+            <a:r>
+              <a:rPr lang="en-GB" dirty="0">
+                <a:ea typeface="+mn-lt"/>
+                <a:cs typeface="+mn-lt"/>
+              </a:rPr>
+              <a:t> graphics × 8</a:t>
+            </a:r>
+            <a:r>
+              <a:rPr lang="en-GB" dirty="0"/>
               <a:t>, RAM 16,0 GB, SSD  </a:t>
             </a:r>
           </a:p>
@@ -10167,7 +10356,7 @@
           </a:p>
           <a:p>
             <a:r>
-              <a:rPr lang="en-GB"/>
+              <a:rPr lang="en-GB" dirty="0"/>
               <a:t>  Best results on windows PC:</a:t>
             </a:r>
           </a:p>
@@ -10177,8 +10366,16 @@
               <a:buChar char="-"/>
             </a:pPr>
             <a:r>
-              <a:rPr lang="en-GB"/>
-              <a:t>Running time for 200 files sequentialy: 145 s</a:t>
+              <a:rPr lang="en-GB" dirty="0"/>
+              <a:t>Running time for 200 files </a:t>
+            </a:r>
+            <a:r>
+              <a:rPr lang="en-GB" dirty="0" err="1"/>
+              <a:t>sequentialy</a:t>
+            </a:r>
+            <a:r>
+              <a:rPr lang="en-GB" dirty="0"/>
+              <a:t>: 145 s</a:t>
             </a:r>
           </a:p>
           <a:p>
@@ -10187,7 +10384,7 @@
               <a:buChar char="-"/>
             </a:pPr>
             <a:r>
-              <a:rPr lang="en-GB"/>
+              <a:rPr lang="en-GB" dirty="0"/>
               <a:t>Running time for 200 files multiprocessing on 10 cores: 45 s (best configuration – multi terminal approach)</a:t>
             </a:r>
           </a:p>
@@ -10197,18 +10394,18 @@
               <a:buChar char="-"/>
             </a:pPr>
             <a:r>
-              <a:rPr lang="en-GB"/>
+              <a:rPr lang="en-GB" dirty="0"/>
               <a:t>Speed up: </a:t>
             </a:r>
             <a:r>
-              <a:rPr lang="en-GB" b="1"/>
+              <a:rPr lang="en-GB" b="1" dirty="0"/>
               <a:t>3,2 times </a:t>
             </a:r>
             <a:r>
-              <a:rPr lang="en-GB"/>
+              <a:rPr lang="en-GB" dirty="0"/>
               <a:t>vs expected nearly 10 times</a:t>
             </a:r>
-            <a:endParaRPr lang="en-GB" b="1"/>
+            <a:endParaRPr lang="en-GB" b="1" dirty="0"/>
           </a:p>
         </p:txBody>
       </p:sp>

</xml_diff>